<commit_message>
Returned Gruntfile (because now it work for everyone) +
Prezentacija fixes
</commit_message>
<xml_diff>
--- a/Prezentacija/Prezentacija.pptx
+++ b/Prezentacija/Prezentacija.pptx
@@ -131,7 +131,7 @@
 <file path=ppt/charts/chart1.xml><?xml version="1.0" encoding="utf-8"?>
 <c:chartSpace xmlns:c="http://schemas.openxmlformats.org/drawingml/2006/chart" xmlns:a="http://schemas.openxmlformats.org/drawingml/2006/main" xmlns:r="http://schemas.openxmlformats.org/officeDocument/2006/relationships">
   <c:date1904 val="0"/>
-  <c:lang val="hr-HR"/>
+  <c:lang val="en-US"/>
   <c:roundedCorners val="0"/>
   <mc:AlternateContent xmlns:mc="http://schemas.openxmlformats.org/markup-compatibility/2006">
     <mc:Choice xmlns:c14="http://schemas.microsoft.com/office/drawing/2007/8/2/chart" Requires="c14">
@@ -173,7 +173,6 @@
           </a:p>
         </c:rich>
       </c:tx>
-      <c:layout/>
       <c:overlay val="0"/>
       <c:spPr>
         <a:noFill/>
@@ -199,7 +198,7 @@
               <a:cs typeface="+mn-cs"/>
             </a:defRPr>
           </a:pPr>
-          <a:endParaRPr lang="sr-Latn-RS"/>
+          <a:endParaRPr lang="en-US"/>
         </a:p>
       </c:txPr>
     </c:title>
@@ -849,11 +848,11 @@
         </c:dLbls>
         <c:gapWidth val="150"/>
         <c:overlap val="100"/>
-        <c:axId val="291227976"/>
-        <c:axId val="291229152"/>
+        <c:axId val="-17325856"/>
+        <c:axId val="-17328032"/>
       </c:barChart>
       <c:catAx>
-        <c:axId val="291227976"/>
+        <c:axId val="-17325856"/>
         <c:scaling>
           <c:orientation val="minMax"/>
         </c:scaling>
@@ -893,10 +892,10 @@
                 <a:cs typeface="+mn-cs"/>
               </a:defRPr>
             </a:pPr>
-            <a:endParaRPr lang="sr-Latn-RS"/>
+            <a:endParaRPr lang="en-US"/>
           </a:p>
         </c:txPr>
-        <c:crossAx val="291229152"/>
+        <c:crossAx val="-17328032"/>
         <c:crosses val="autoZero"/>
         <c:auto val="1"/>
         <c:lblAlgn val="ctr"/>
@@ -904,7 +903,7 @@
         <c:noMultiLvlLbl val="0"/>
       </c:catAx>
       <c:valAx>
-        <c:axId val="291229152"/>
+        <c:axId val="-17328032"/>
         <c:scaling>
           <c:orientation val="minMax"/>
         </c:scaling>
@@ -952,10 +951,10 @@
                 <a:cs typeface="+mn-cs"/>
               </a:defRPr>
             </a:pPr>
-            <a:endParaRPr lang="sr-Latn-RS"/>
+            <a:endParaRPr lang="en-US"/>
           </a:p>
         </c:txPr>
-        <c:crossAx val="291227976"/>
+        <c:crossAx val="-17325856"/>
         <c:crosses val="autoZero"/>
         <c:crossBetween val="between"/>
       </c:valAx>
@@ -985,7 +984,7 @@
       <a:pPr>
         <a:defRPr/>
       </a:pPr>
-      <a:endParaRPr lang="sr-Latn-RS"/>
+      <a:endParaRPr lang="en-US"/>
     </a:p>
   </c:txPr>
   <c:externalData r:id="rId3">
@@ -1621,7 +1620,7 @@
           <a:p>
             <a:fld id="{E4DFF214-730F-47C2-B0BB-677D5AB44F5F}" type="datetimeFigureOut">
               <a:rPr lang="hr-HR" smtClean="0"/>
-              <a:t>25.1.2016.</a:t>
+              <a:t>28.1.2016.</a:t>
             </a:fld>
             <a:endParaRPr lang="hr-HR"/>
           </a:p>
@@ -2076,6 +2075,90 @@
       </p:grpSpPr>
       <p:sp>
         <p:nvSpPr>
+          <p:cNvPr id="2" name="Slide Image Placeholder 1"/>
+          <p:cNvSpPr>
+            <a:spLocks noGrp="1" noRot="1" noChangeAspect="1"/>
+          </p:cNvSpPr>
+          <p:nvPr>
+            <p:ph type="sldImg"/>
+          </p:nvPr>
+        </p:nvSpPr>
+        <p:spPr/>
+      </p:sp>
+      <p:sp>
+        <p:nvSpPr>
+          <p:cNvPr id="3" name="Notes Placeholder 2"/>
+          <p:cNvSpPr>
+            <a:spLocks noGrp="1"/>
+          </p:cNvSpPr>
+          <p:nvPr>
+            <p:ph type="body" idx="1"/>
+          </p:nvPr>
+        </p:nvSpPr>
+        <p:spPr/>
+        <p:txBody>
+          <a:bodyPr/>
+          <a:lstStyle/>
+          <a:p>
+            <a:endParaRPr lang="en-GB"/>
+          </a:p>
+        </p:txBody>
+      </p:sp>
+      <p:sp>
+        <p:nvSpPr>
+          <p:cNvPr id="4" name="Slide Number Placeholder 3"/>
+          <p:cNvSpPr>
+            <a:spLocks noGrp="1"/>
+          </p:cNvSpPr>
+          <p:nvPr>
+            <p:ph type="sldNum" sz="quarter" idx="10"/>
+          </p:nvPr>
+        </p:nvSpPr>
+        <p:spPr/>
+        <p:txBody>
+          <a:bodyPr/>
+          <a:lstStyle/>
+          <a:p>
+            <a:fld id="{58C63DB6-863B-4866-B6BB-955CB90FA6D1}" type="slidenum">
+              <a:rPr lang="hr-HR" smtClean="0"/>
+              <a:t>6</a:t>
+            </a:fld>
+            <a:endParaRPr lang="hr-HR"/>
+          </a:p>
+        </p:txBody>
+      </p:sp>
+    </p:spTree>
+    <p:extLst>
+      <p:ext uri="{BB962C8B-B14F-4D97-AF65-F5344CB8AC3E}">
+        <p14:creationId xmlns:p14="http://schemas.microsoft.com/office/powerpoint/2010/main" val="1723122173"/>
+      </p:ext>
+    </p:extLst>
+  </p:cSld>
+  <p:clrMapOvr>
+    <a:masterClrMapping/>
+  </p:clrMapOvr>
+</p:notes>
+</file>
+
+<file path=ppt/notesSlides/notesSlide4.xml><?xml version="1.0" encoding="utf-8"?>
+<p:notes xmlns:a="http://schemas.openxmlformats.org/drawingml/2006/main" xmlns:r="http://schemas.openxmlformats.org/officeDocument/2006/relationships" xmlns:p="http://schemas.openxmlformats.org/presentationml/2006/main">
+  <p:cSld>
+    <p:spTree>
+      <p:nvGrpSpPr>
+        <p:cNvPr id="1" name=""/>
+        <p:cNvGrpSpPr/>
+        <p:nvPr/>
+      </p:nvGrpSpPr>
+      <p:grpSpPr>
+        <a:xfrm>
+          <a:off x="0" y="0"/>
+          <a:ext cx="0" cy="0"/>
+          <a:chOff x="0" y="0"/>
+          <a:chExt cx="0" cy="0"/>
+        </a:xfrm>
+      </p:grpSpPr>
+      <p:sp>
+        <p:nvSpPr>
           <p:cNvPr id="2" name="Rezervirano mjesto slike slajda 1"/>
           <p:cNvSpPr>
             <a:spLocks noGrp="1" noRot="1" noChangeAspect="1"/>
@@ -2384,10 +2467,6 @@
             </a:lvl1pPr>
           </a:lstStyle>
           <a:p>
-            <a:fld id="{2D2CC0AB-82F8-4982-8137-23AA4A106949}" type="datetime1">
-              <a:rPr lang="en-US" smtClean="0"/>
-              <a:t>1/25/2016</a:t>
-            </a:fld>
             <a:endParaRPr lang="en-US" dirty="0"/>
           </a:p>
         </p:txBody>
@@ -2424,8 +2503,8 @@
           </a:lstStyle>
           <a:p>
             <a:r>
-              <a:rPr lang="en-US" smtClean="0"/>
-              <a:t>[OPP Projekt] Bananablade - Sustav za arhiviranje i reprodukciju tonskih zapisa</a:t>
+              <a:rPr lang="nn-NO" smtClean="0"/>
+              <a:t>[OPP] Bananablade - Sustav za arhiviranje i reprodukciju tonskih zapisa</a:t>
             </a:r>
             <a:endParaRPr lang="en-US" dirty="0"/>
           </a:p>
@@ -2651,10 +2730,6 @@
           <a:bodyPr/>
           <a:lstStyle/>
           <a:p>
-            <a:fld id="{B70487C3-7E6D-4D18-AD87-E8429B71EA70}" type="datetime1">
-              <a:rPr lang="en-US" smtClean="0"/>
-              <a:t>1/25/2016</a:t>
-            </a:fld>
             <a:endParaRPr lang="en-US" dirty="0"/>
           </a:p>
         </p:txBody>
@@ -2675,8 +2750,8 @@
           <a:lstStyle/>
           <a:p>
             <a:r>
-              <a:rPr lang="en-US" smtClean="0"/>
-              <a:t>[OPP Projekt] Bananablade - Sustav za arhiviranje i reprodukciju tonskih zapisa</a:t>
+              <a:rPr lang="nn-NO" smtClean="0"/>
+              <a:t>[OPP] Bananablade - Sustav za arhiviranje i reprodukciju tonskih zapisa</a:t>
             </a:r>
             <a:endParaRPr lang="en-US" dirty="0"/>
           </a:p>
@@ -2891,10 +2966,6 @@
             </a:lvl1pPr>
           </a:lstStyle>
           <a:p>
-            <a:fld id="{10DEAAAA-2BFF-4D2F-905B-5C3D883FF8E4}" type="datetime1">
-              <a:rPr lang="en-US" smtClean="0"/>
-              <a:t>1/25/2016</a:t>
-            </a:fld>
             <a:endParaRPr lang="en-US" dirty="0"/>
           </a:p>
         </p:txBody>
@@ -2920,8 +2991,8 @@
           <a:lstStyle/>
           <a:p>
             <a:r>
-              <a:rPr lang="en-US" smtClean="0"/>
-              <a:t>[OPP Projekt] Bananablade - Sustav za arhiviranje i reprodukciju tonskih zapisa</a:t>
+              <a:rPr lang="nn-NO" smtClean="0"/>
+              <a:t>[OPP] Bananablade - Sustav za arhiviranje i reprodukciju tonskih zapisa</a:t>
             </a:r>
             <a:endParaRPr lang="en-US" dirty="0"/>
           </a:p>
@@ -3142,8 +3213,68 @@
           <a:lstStyle/>
           <a:p>
             <a:r>
-              <a:rPr lang="en-US" smtClean="0"/>
-              <a:t>[OPP Projekt] Bananablade - Sustav za arhiviranje i reprodukciju tonskih zapisa</a:t>
+              <a:rPr lang="en-US" dirty="0" smtClean="0"/>
+              <a:t>[OPP] </a:t>
+            </a:r>
+            <a:r>
+              <a:rPr lang="en-US" dirty="0" err="1" smtClean="0"/>
+              <a:t>Bananablade</a:t>
+            </a:r>
+            <a:r>
+              <a:rPr lang="en-US" dirty="0" smtClean="0"/>
+              <a:t> - </a:t>
+            </a:r>
+            <a:r>
+              <a:rPr lang="en-US" dirty="0" err="1" smtClean="0"/>
+              <a:t>Sustav</a:t>
+            </a:r>
+            <a:r>
+              <a:rPr lang="en-US" dirty="0" smtClean="0"/>
+              <a:t> </a:t>
+            </a:r>
+            <a:r>
+              <a:rPr lang="en-US" dirty="0" err="1" smtClean="0"/>
+              <a:t>za</a:t>
+            </a:r>
+            <a:r>
+              <a:rPr lang="en-US" dirty="0" smtClean="0"/>
+              <a:t> </a:t>
+            </a:r>
+            <a:r>
+              <a:rPr lang="en-US" dirty="0" err="1" smtClean="0"/>
+              <a:t>arhiviranje</a:t>
+            </a:r>
+            <a:r>
+              <a:rPr lang="en-US" dirty="0" smtClean="0"/>
+              <a:t> </a:t>
+            </a:r>
+            <a:r>
+              <a:rPr lang="en-US" dirty="0" err="1" smtClean="0"/>
+              <a:t>i</a:t>
+            </a:r>
+            <a:r>
+              <a:rPr lang="en-US" dirty="0" smtClean="0"/>
+              <a:t> </a:t>
+            </a:r>
+            <a:r>
+              <a:rPr lang="en-US" dirty="0" err="1" smtClean="0"/>
+              <a:t>reprodukciju</a:t>
+            </a:r>
+            <a:r>
+              <a:rPr lang="en-US" dirty="0" smtClean="0"/>
+              <a:t> </a:t>
+            </a:r>
+            <a:r>
+              <a:rPr lang="en-US" dirty="0" err="1" smtClean="0"/>
+              <a:t>tonskih</a:t>
+            </a:r>
+            <a:r>
+              <a:rPr lang="en-US" dirty="0" smtClean="0"/>
+              <a:t> </a:t>
+            </a:r>
+            <a:r>
+              <a:rPr lang="en-US" dirty="0" err="1" smtClean="0"/>
+              <a:t>zapisa</a:t>
             </a:r>
             <a:endParaRPr lang="en-US" dirty="0"/>
           </a:p>
@@ -3469,10 +3600,6 @@
             </a:lvl1pPr>
           </a:lstStyle>
           <a:p>
-            <a:fld id="{19EBA704-390E-4274-979A-84553B06C826}" type="datetime1">
-              <a:rPr lang="en-US" smtClean="0"/>
-              <a:t>1/25/2016</a:t>
-            </a:fld>
             <a:endParaRPr lang="en-US" dirty="0"/>
           </a:p>
         </p:txBody>
@@ -3504,8 +3631,8 @@
           </a:lstStyle>
           <a:p>
             <a:r>
-              <a:rPr lang="en-US" smtClean="0"/>
-              <a:t>[OPP Projekt] Bananablade - Sustav za arhiviranje i reprodukciju tonskih zapisa</a:t>
+              <a:rPr lang="nn-NO" smtClean="0"/>
+              <a:t>[OPP] Bananablade - Sustav za arhiviranje i reprodukciju tonskih zapisa</a:t>
             </a:r>
             <a:endParaRPr lang="en-US" dirty="0"/>
           </a:p>
@@ -3776,10 +3903,6 @@
           <a:bodyPr/>
           <a:lstStyle/>
           <a:p>
-            <a:fld id="{780D3442-ADEF-4032-A9D4-00BD27418FE9}" type="datetime1">
-              <a:rPr lang="en-US" smtClean="0"/>
-              <a:t>1/25/2016</a:t>
-            </a:fld>
             <a:endParaRPr lang="en-US" dirty="0"/>
           </a:p>
         </p:txBody>
@@ -3800,8 +3923,8 @@
           <a:lstStyle/>
           <a:p>
             <a:r>
-              <a:rPr lang="en-US" smtClean="0"/>
-              <a:t>[OPP Projekt] Bananablade - Sustav za arhiviranje i reprodukciju tonskih zapisa</a:t>
+              <a:rPr lang="nn-NO" smtClean="0"/>
+              <a:t>[OPP] Bananablade - Sustav za arhiviranje i reprodukciju tonskih zapisa</a:t>
             </a:r>
             <a:endParaRPr lang="en-US" dirty="0"/>
           </a:p>
@@ -4203,10 +4326,6 @@
           <a:bodyPr/>
           <a:lstStyle/>
           <a:p>
-            <a:fld id="{EDCE4E46-871F-4615-A903-5FAA74BDB89F}" type="datetime1">
-              <a:rPr lang="en-US" smtClean="0"/>
-              <a:t>1/25/2016</a:t>
-            </a:fld>
             <a:endParaRPr lang="en-US" dirty="0"/>
           </a:p>
         </p:txBody>
@@ -4227,8 +4346,8 @@
           <a:lstStyle/>
           <a:p>
             <a:r>
-              <a:rPr lang="en-US" smtClean="0"/>
-              <a:t>[OPP Projekt] Bananablade - Sustav za arhiviranje i reprodukciju tonskih zapisa</a:t>
+              <a:rPr lang="nn-NO" smtClean="0"/>
+              <a:t>[OPP] Bananablade - Sustav za arhiviranje i reprodukciju tonskih zapisa</a:t>
             </a:r>
             <a:endParaRPr lang="en-US" dirty="0"/>
           </a:p>
@@ -4303,10 +4422,6 @@
           <a:bodyPr/>
           <a:lstStyle/>
           <a:p>
-            <a:fld id="{1B0B0F09-A4FB-4A1A-A00B-52E16BEF5F97}" type="datetime1">
-              <a:rPr lang="en-US" smtClean="0"/>
-              <a:t>1/25/2016</a:t>
-            </a:fld>
             <a:endParaRPr lang="en-US" dirty="0"/>
           </a:p>
         </p:txBody>
@@ -4327,8 +4442,8 @@
           <a:lstStyle/>
           <a:p>
             <a:r>
-              <a:rPr lang="en-US" smtClean="0"/>
-              <a:t>[OPP Projekt] Bananablade - Sustav za arhiviranje i reprodukciju tonskih zapisa</a:t>
+              <a:rPr lang="nn-NO" smtClean="0"/>
+              <a:t>[OPP] Bananablade - Sustav za arhiviranje i reprodukciju tonskih zapisa</a:t>
             </a:r>
             <a:endParaRPr lang="en-US" dirty="0"/>
           </a:p>
@@ -4470,10 +4585,6 @@
           <a:bodyPr/>
           <a:lstStyle/>
           <a:p>
-            <a:fld id="{DB1C1FE4-0C86-42BB-B4D3-66820A05031D}" type="datetime1">
-              <a:rPr lang="en-US" smtClean="0"/>
-              <a:t>1/25/2016</a:t>
-            </a:fld>
             <a:endParaRPr lang="en-US" dirty="0"/>
           </a:p>
         </p:txBody>
@@ -4494,8 +4605,8 @@
           <a:lstStyle/>
           <a:p>
             <a:r>
-              <a:rPr lang="en-US" smtClean="0"/>
-              <a:t>[OPP Projekt] Bananablade - Sustav za arhiviranje i reprodukciju tonskih zapisa</a:t>
+              <a:rPr lang="nn-NO" smtClean="0"/>
+              <a:t>[OPP] Bananablade - Sustav za arhiviranje i reprodukciju tonskih zapisa</a:t>
             </a:r>
             <a:endParaRPr lang="en-US" dirty="0"/>
           </a:p>
@@ -4853,10 +4964,6 @@
             </a:lvl1pPr>
           </a:lstStyle>
           <a:p>
-            <a:fld id="{0F0202DA-52FC-492D-A756-188566781B2E}" type="datetime1">
-              <a:rPr lang="en-US" smtClean="0"/>
-              <a:t>1/25/2016</a:t>
-            </a:fld>
             <a:endParaRPr lang="en-US" dirty="0"/>
           </a:p>
         </p:txBody>
@@ -4888,8 +4995,8 @@
           </a:lstStyle>
           <a:p>
             <a:r>
-              <a:rPr lang="en-US" smtClean="0"/>
-              <a:t>[OPP Projekt] Bananablade - Sustav za arhiviranje i reprodukciju tonskih zapisa</a:t>
+              <a:rPr lang="nn-NO" smtClean="0"/>
+              <a:t>[OPP] Bananablade - Sustav za arhiviranje i reprodukciju tonskih zapisa</a:t>
             </a:r>
             <a:endParaRPr lang="en-US" dirty="0"/>
           </a:p>
@@ -5147,10 +5254,6 @@
           <a:bodyPr/>
           <a:lstStyle/>
           <a:p>
-            <a:fld id="{AAD24D4D-834D-40F7-8614-7EAB222EC555}" type="datetime1">
-              <a:rPr lang="en-US" smtClean="0"/>
-              <a:t>1/25/2016</a:t>
-            </a:fld>
             <a:endParaRPr lang="en-US" dirty="0"/>
           </a:p>
         </p:txBody>
@@ -5171,8 +5274,8 @@
           <a:lstStyle/>
           <a:p>
             <a:r>
-              <a:rPr lang="en-US" smtClean="0"/>
-              <a:t>[OPP Projekt] Bananablade - Sustav za arhiviranje i reprodukciju tonskih zapisa</a:t>
+              <a:rPr lang="nn-NO" smtClean="0"/>
+              <a:t>[OPP] Bananablade - Sustav za arhiviranje i reprodukciju tonskih zapisa</a:t>
             </a:r>
             <a:endParaRPr lang="en-US" dirty="0"/>
           </a:p>
@@ -5363,10 +5466,6 @@
             </a:lvl1pPr>
           </a:lstStyle>
           <a:p>
-            <a:fld id="{0ADA977C-BAC9-4331-B721-B185BEA01338}" type="datetime1">
-              <a:rPr lang="en-US" smtClean="0"/>
-              <a:t>1/25/2016</a:t>
-            </a:fld>
             <a:endParaRPr lang="en-US" dirty="0"/>
           </a:p>
         </p:txBody>
@@ -5403,8 +5502,68 @@
           </a:lstStyle>
           <a:p>
             <a:r>
-              <a:rPr lang="en-US" smtClean="0"/>
-              <a:t>[OPP Projekt] Bananablade - Sustav za arhiviranje i reprodukciju tonskih zapisa</a:t>
+              <a:rPr lang="en-US" dirty="0" smtClean="0"/>
+              <a:t>[OPP] </a:t>
+            </a:r>
+            <a:r>
+              <a:rPr lang="en-US" dirty="0" err="1" smtClean="0"/>
+              <a:t>Bananablade</a:t>
+            </a:r>
+            <a:r>
+              <a:rPr lang="en-US" dirty="0" smtClean="0"/>
+              <a:t> - </a:t>
+            </a:r>
+            <a:r>
+              <a:rPr lang="en-US" dirty="0" err="1" smtClean="0"/>
+              <a:t>Sustav</a:t>
+            </a:r>
+            <a:r>
+              <a:rPr lang="en-US" dirty="0" smtClean="0"/>
+              <a:t> </a:t>
+            </a:r>
+            <a:r>
+              <a:rPr lang="en-US" dirty="0" err="1" smtClean="0"/>
+              <a:t>za</a:t>
+            </a:r>
+            <a:r>
+              <a:rPr lang="en-US" dirty="0" smtClean="0"/>
+              <a:t> </a:t>
+            </a:r>
+            <a:r>
+              <a:rPr lang="en-US" dirty="0" err="1" smtClean="0"/>
+              <a:t>arhiviranje</a:t>
+            </a:r>
+            <a:r>
+              <a:rPr lang="en-US" dirty="0" smtClean="0"/>
+              <a:t> </a:t>
+            </a:r>
+            <a:r>
+              <a:rPr lang="en-US" dirty="0" err="1" smtClean="0"/>
+              <a:t>i</a:t>
+            </a:r>
+            <a:r>
+              <a:rPr lang="en-US" dirty="0" smtClean="0"/>
+              <a:t> </a:t>
+            </a:r>
+            <a:r>
+              <a:rPr lang="en-US" dirty="0" err="1" smtClean="0"/>
+              <a:t>reprodukciju</a:t>
+            </a:r>
+            <a:r>
+              <a:rPr lang="en-US" dirty="0" smtClean="0"/>
+              <a:t> </a:t>
+            </a:r>
+            <a:r>
+              <a:rPr lang="en-US" dirty="0" err="1" smtClean="0"/>
+              <a:t>tonskih</a:t>
+            </a:r>
+            <a:r>
+              <a:rPr lang="en-US" dirty="0" smtClean="0"/>
+              <a:t> </a:t>
+            </a:r>
+            <a:r>
+              <a:rPr lang="en-US" dirty="0" err="1" smtClean="0"/>
+              <a:t>zapisa</a:t>
             </a:r>
             <a:endParaRPr lang="en-US" dirty="0"/>
           </a:p>
@@ -6395,8 +6554,8 @@
           <a:lstStyle/>
           <a:p>
             <a:r>
-              <a:rPr lang="en-US" smtClean="0"/>
-              <a:t>[OPP Projekt] Bananablade - Sustav za arhiviranje i reprodukciju tonskih zapisa</a:t>
+              <a:rPr lang="nn-NO" smtClean="0"/>
+              <a:t>[OPP] Bananablade - Sustav za arhiviranje i reprodukciju tonskih zapisa</a:t>
             </a:r>
             <a:endParaRPr lang="en-US" dirty="0"/>
           </a:p>
@@ -6669,8 +6828,8 @@
           <a:lstStyle/>
           <a:p>
             <a:r>
-              <a:rPr lang="en-US" smtClean="0"/>
-              <a:t>[OPP Projekt] Bananablade - Sustav za arhiviranje i reprodukciju tonskih zapisa</a:t>
+              <a:rPr lang="nn-NO" smtClean="0"/>
+              <a:t>[OPP] Bananablade - Sustav za arhiviranje i reprodukciju tonskih zapisa</a:t>
             </a:r>
             <a:endParaRPr lang="en-US" dirty="0"/>
           </a:p>
@@ -6846,8 +7005,8 @@
           <a:lstStyle/>
           <a:p>
             <a:r>
-              <a:rPr lang="en-US" smtClean="0"/>
-              <a:t>[OPP Projekt] Bananablade - Sustav za arhiviranje i reprodukciju tonskih zapisa</a:t>
+              <a:rPr lang="nn-NO" smtClean="0"/>
+              <a:t>[OPP] Bananablade - Sustav za arhiviranje i reprodukciju tonskih zapisa</a:t>
             </a:r>
             <a:endParaRPr lang="en-US" dirty="0"/>
           </a:p>
@@ -6997,8 +7156,8 @@
           <a:lstStyle/>
           <a:p>
             <a:r>
-              <a:rPr lang="en-US" smtClean="0"/>
-              <a:t>[OPP Projekt] Bananablade - Sustav za arhiviranje i reprodukciju tonskih zapisa</a:t>
+              <a:rPr lang="nn-NO" smtClean="0"/>
+              <a:t>[OPP] Bananablade - Sustav za arhiviranje i reprodukciju tonskih zapisa</a:t>
             </a:r>
             <a:endParaRPr lang="en-US" dirty="0"/>
           </a:p>
@@ -7287,8 +7446,8 @@
           <a:lstStyle/>
           <a:p>
             <a:r>
-              <a:rPr lang="en-US" smtClean="0"/>
-              <a:t>[OPP Projekt] Bananablade - Sustav za arhiviranje i reprodukciju tonskih zapisa</a:t>
+              <a:rPr lang="nn-NO" smtClean="0"/>
+              <a:t>[OPP] Bananablade - Sustav za arhiviranje i reprodukciju tonskih zapisa</a:t>
             </a:r>
             <a:endParaRPr lang="en-US" dirty="0"/>
           </a:p>
@@ -7483,8 +7642,8 @@
           <a:lstStyle/>
           <a:p>
             <a:r>
-              <a:rPr lang="en-US" smtClean="0"/>
-              <a:t>[OPP Projekt] Bananablade - Sustav za arhiviranje i reprodukciju tonskih zapisa</a:t>
+              <a:rPr lang="nn-NO" smtClean="0"/>
+              <a:t>[OPP] Bananablade - Sustav za arhiviranje i reprodukciju tonskih zapisa</a:t>
             </a:r>
             <a:endParaRPr lang="en-US" dirty="0"/>
           </a:p>
@@ -7708,8 +7867,8 @@
           <a:lstStyle/>
           <a:p>
             <a:r>
-              <a:rPr lang="en-US" smtClean="0"/>
-              <a:t>[OPP Projekt] Bananablade - Sustav za arhiviranje i reprodukciju tonskih zapisa</a:t>
+              <a:rPr lang="nn-NO" smtClean="0"/>
+              <a:t>[OPP] Bananablade - Sustav za arhiviranje i reprodukciju tonskih zapisa</a:t>
             </a:r>
             <a:endParaRPr lang="en-US" dirty="0"/>
           </a:p>
@@ -7945,8 +8104,72 @@
           <a:lstStyle/>
           <a:p>
             <a:r>
-              <a:rPr lang="en-US" smtClean="0"/>
-              <a:t>[OPP Projekt] Bananablade - Sustav za arhiviranje i reprodukciju tonskih zapisa</a:t>
+              <a:rPr lang="en-US" dirty="0" smtClean="0"/>
+              <a:t>[OPP] </a:t>
+            </a:r>
+            <a:r>
+              <a:rPr lang="en-US" dirty="0" err="1" smtClean="0"/>
+              <a:t>Bananablade</a:t>
+            </a:r>
+            <a:r>
+              <a:rPr lang="en-US" dirty="0" smtClean="0"/>
+              <a:t> </a:t>
+            </a:r>
+            <a:r>
+              <a:rPr lang="en-US" dirty="0" smtClean="0"/>
+              <a:t>- </a:t>
+            </a:r>
+            <a:r>
+              <a:rPr lang="en-US" dirty="0" err="1" smtClean="0"/>
+              <a:t>Sustav</a:t>
+            </a:r>
+            <a:r>
+              <a:rPr lang="en-US" dirty="0" smtClean="0"/>
+              <a:t> </a:t>
+            </a:r>
+            <a:r>
+              <a:rPr lang="en-US" dirty="0" err="1" smtClean="0"/>
+              <a:t>za</a:t>
+            </a:r>
+            <a:r>
+              <a:rPr lang="en-US" dirty="0" smtClean="0"/>
+              <a:t> </a:t>
+            </a:r>
+            <a:r>
+              <a:rPr lang="en-US" dirty="0" err="1" smtClean="0"/>
+              <a:t>arhiviranje</a:t>
+            </a:r>
+            <a:r>
+              <a:rPr lang="en-US" dirty="0" smtClean="0"/>
+              <a:t> </a:t>
+            </a:r>
+            <a:r>
+              <a:rPr lang="en-US" dirty="0" err="1" smtClean="0"/>
+              <a:t>i</a:t>
+            </a:r>
+            <a:r>
+              <a:rPr lang="en-US" dirty="0" smtClean="0"/>
+              <a:t> </a:t>
+            </a:r>
+            <a:r>
+              <a:rPr lang="en-US" dirty="0" err="1" smtClean="0"/>
+              <a:t>reprodukciju</a:t>
+            </a:r>
+            <a:r>
+              <a:rPr lang="en-US" dirty="0" smtClean="0"/>
+              <a:t> </a:t>
+            </a:r>
+            <a:r>
+              <a:rPr lang="en-US" dirty="0" err="1" smtClean="0"/>
+              <a:t>tonskih</a:t>
+            </a:r>
+            <a:r>
+              <a:rPr lang="en-US" dirty="0" smtClean="0"/>
+              <a:t> </a:t>
+            </a:r>
+            <a:r>
+              <a:rPr lang="en-US" dirty="0" err="1" smtClean="0"/>
+              <a:t>zapisa</a:t>
             </a:r>
             <a:endParaRPr lang="en-US" dirty="0"/>
           </a:p>
@@ -8156,8 +8379,8 @@
           <a:lstStyle/>
           <a:p>
             <a:r>
-              <a:rPr lang="en-US" smtClean="0"/>
-              <a:t>[OPP Projekt] Bananablade - Sustav za arhiviranje i reprodukciju tonskih zapisa</a:t>
+              <a:rPr lang="nn-NO" smtClean="0"/>
+              <a:t>[OPP] Bananablade - Sustav za arhiviranje i reprodukciju tonskih zapisa</a:t>
             </a:r>
             <a:endParaRPr lang="en-US" dirty="0"/>
           </a:p>
@@ -8333,7 +8556,7 @@
           <p:nvPr/>
         </p:nvPicPr>
         <p:blipFill>
-          <a:blip r:embed="rId2">
+          <a:blip r:embed="rId3">
             <a:extLst>
               <a:ext uri="{28A0092B-C50C-407E-A947-70E740481C1C}">
                 <a14:useLocalDpi xmlns:a14="http://schemas.microsoft.com/office/drawing/2010/main" val="0"/>
@@ -8363,7 +8586,7 @@
           <p:nvPr/>
         </p:nvPicPr>
         <p:blipFill>
-          <a:blip r:embed="rId3">
+          <a:blip r:embed="rId4">
             <a:extLst>
               <a:ext uri="{28A0092B-C50C-407E-A947-70E740481C1C}">
                 <a14:useLocalDpi xmlns:a14="http://schemas.microsoft.com/office/drawing/2010/main" val="0"/>
@@ -8393,7 +8616,7 @@
           <p:nvPr/>
         </p:nvPicPr>
         <p:blipFill>
-          <a:blip r:embed="rId4">
+          <a:blip r:embed="rId5">
             <a:extLst>
               <a:ext uri="{28A0092B-C50C-407E-A947-70E740481C1C}">
                 <a14:useLocalDpi xmlns:a14="http://schemas.microsoft.com/office/drawing/2010/main" val="0"/>
@@ -8454,8 +8677,8 @@
           <a:lstStyle/>
           <a:p>
             <a:r>
-              <a:rPr lang="en-US" smtClean="0"/>
-              <a:t>[OPP Projekt] Bananablade - Sustav za arhiviranje i reprodukciju tonskih zapisa</a:t>
+              <a:rPr lang="nn-NO" smtClean="0"/>
+              <a:t>[OPP] Bananablade - Sustav za arhiviranje i reprodukciju tonskih zapisa</a:t>
             </a:r>
             <a:endParaRPr lang="en-US" dirty="0"/>
           </a:p>
@@ -8799,8 +9022,8 @@
           <a:lstStyle/>
           <a:p>
             <a:r>
-              <a:rPr lang="en-US" smtClean="0"/>
-              <a:t>[OPP Projekt] Bananablade - Sustav za arhiviranje i reprodukciju tonskih zapisa</a:t>
+              <a:rPr lang="nn-NO" smtClean="0"/>
+              <a:t>[OPP] Bananablade - Sustav za arhiviranje i reprodukciju tonskih zapisa</a:t>
             </a:r>
             <a:endParaRPr lang="en-US" dirty="0"/>
           </a:p>
@@ -8945,8 +9168,8 @@
           <a:lstStyle/>
           <a:p>
             <a:r>
-              <a:rPr lang="en-US" smtClean="0"/>
-              <a:t>[OPP Projekt] Bananablade - Sustav za arhiviranje i reprodukciju tonskih zapisa</a:t>
+              <a:rPr lang="nn-NO" smtClean="0"/>
+              <a:t>[OPP] Bananablade - Sustav za arhiviranje i reprodukciju tonskih zapisa</a:t>
             </a:r>
             <a:endParaRPr lang="en-US" dirty="0"/>
           </a:p>
@@ -9123,8 +9346,8 @@
           <a:lstStyle/>
           <a:p>
             <a:r>
-              <a:rPr lang="en-US" smtClean="0"/>
-              <a:t>[OPP Projekt] Bananablade - Sustav za arhiviranje i reprodukciju tonskih zapisa</a:t>
+              <a:rPr lang="nn-NO" smtClean="0"/>
+              <a:t>[OPP] Bananablade - Sustav za arhiviranje i reprodukciju tonskih zapisa</a:t>
             </a:r>
             <a:endParaRPr lang="en-US" dirty="0"/>
           </a:p>

</xml_diff>